<commit_message>
Updates stack slides, adds bitwise/bitfield slides, project 1.
</commit_message>
<xml_diff>
--- a/slides/09_CS0447_The_Stack.pptx
+++ b/slides/09_CS0447_The_Stack.pptx
@@ -6,7 +6,7 @@
     <p:sldMasterId id="2147483986" r:id="rId2"/>
   </p:sldMasterIdLst>
   <p:notesMasterIdLst>
-    <p:notesMasterId r:id="rId15"/>
+    <p:notesMasterId r:id="rId16"/>
   </p:notesMasterIdLst>
   <p:sldIdLst>
     <p:sldId id="256" r:id="rId3"/>
@@ -21,6 +21,7 @@
     <p:sldId id="266" r:id="rId12"/>
     <p:sldId id="267" r:id="rId13"/>
     <p:sldId id="268" r:id="rId14"/>
+    <p:sldId id="269" r:id="rId15"/>
   </p:sldIdLst>
   <p:sldSz cx="9144000" cy="5715000" type="screen16x10"/>
   <p:notesSz cx="6858000" cy="9144000"/>
@@ -18497,6 +18498,1401 @@
       <p:bldP spid="19" grpId="0"/>
     </p:bldLst>
   </p:timing>
+</p:sld>
+</file>
+
+<file path=ppt/slides/slide13.xml><?xml version="1.0" encoding="utf-8"?>
+<p:sld xmlns:a="http://schemas.openxmlformats.org/drawingml/2006/main" xmlns:r="http://schemas.openxmlformats.org/officeDocument/2006/relationships" xmlns:p="http://schemas.openxmlformats.org/presentationml/2006/main">
+  <p:cSld>
+    <p:spTree>
+      <p:nvGrpSpPr>
+        <p:cNvPr id="1" name=""/>
+        <p:cNvGrpSpPr/>
+        <p:nvPr/>
+      </p:nvGrpSpPr>
+      <p:grpSpPr>
+        <a:xfrm>
+          <a:off x="0" y="0"/>
+          <a:ext cx="0" cy="0"/>
+          <a:chOff x="0" y="0"/>
+          <a:chExt cx="0" cy="0"/>
+        </a:xfrm>
+      </p:grpSpPr>
+      <p:sp>
+        <p:nvSpPr>
+          <p:cNvPr id="2" name="Title 1">
+            <a:extLst>
+              <a:ext uri="{FF2B5EF4-FFF2-40B4-BE49-F238E27FC236}">
+                <a16:creationId xmlns:a16="http://schemas.microsoft.com/office/drawing/2014/main" id="{E3E8572D-A897-455E-A5B3-6E67E197EF81}"/>
+              </a:ext>
+            </a:extLst>
+          </p:cNvPr>
+          <p:cNvSpPr>
+            <a:spLocks noGrp="1"/>
+          </p:cNvSpPr>
+          <p:nvPr>
+            <p:ph type="title"/>
+          </p:nvPr>
+        </p:nvSpPr>
+        <p:spPr/>
+        <p:txBody>
+          <a:bodyPr/>
+          <a:lstStyle/>
+          <a:p>
+            <a:r>
+              <a:rPr lang="en-US" dirty="0"/>
+              <a:t>Summing it up: Terminology</a:t>
+            </a:r>
+          </a:p>
+        </p:txBody>
+      </p:sp>
+      <p:sp>
+        <p:nvSpPr>
+          <p:cNvPr id="5" name="TextShape 2">
+            <a:extLst>
+              <a:ext uri="{FF2B5EF4-FFF2-40B4-BE49-F238E27FC236}">
+                <a16:creationId xmlns:a16="http://schemas.microsoft.com/office/drawing/2014/main" id="{36352DA7-C1FB-4502-9C41-59F0EF340711}"/>
+              </a:ext>
+            </a:extLst>
+          </p:cNvPr>
+          <p:cNvSpPr txBox="1"/>
+          <p:nvPr/>
+        </p:nvSpPr>
+        <p:spPr>
+          <a:xfrm>
+            <a:off x="0" y="617424"/>
+            <a:ext cx="10739520" cy="5303520"/>
+          </a:xfrm>
+          <a:prstGeom prst="rect">
+            <a:avLst/>
+          </a:prstGeom>
+          <a:noFill/>
+          <a:ln>
+            <a:noFill/>
+          </a:ln>
+        </p:spPr>
+        <p:txBody>
+          <a:bodyPr lIns="0" tIns="0" rIns="0" bIns="0">
+            <a:normAutofit/>
+          </a:bodyPr>
+          <a:lstStyle/>
+          <a:p>
+            <a:pPr marL="108000">
+              <a:spcAft>
+                <a:spcPts val="1409"/>
+              </a:spcAft>
+              <a:buClr>
+                <a:srgbClr val="04617B"/>
+              </a:buClr>
+              <a:buSzPct val="45000"/>
+            </a:pPr>
+            <a:r>
+              <a:rPr lang="en-US" sz="3200" b="0" strike="noStrike" spc="-1" dirty="0" err="1">
+                <a:latin typeface="Source Sans Pro"/>
+              </a:rPr>
+              <a:t>myFunction</a:t>
+            </a:r>
+            <a:r>
+              <a:rPr lang="en-US" sz="3200" b="0" strike="noStrike" spc="-1" dirty="0">
+                <a:latin typeface="Source Sans Pro"/>
+              </a:rPr>
+              <a:t>:</a:t>
+            </a:r>
+          </a:p>
+          <a:p>
+            <a:pPr marL="540000" lvl="1">
+              <a:spcAft>
+                <a:spcPts val="1123"/>
+              </a:spcAft>
+              <a:buClr>
+                <a:srgbClr val="04617B"/>
+              </a:buClr>
+              <a:buSzPct val="75000"/>
+            </a:pPr>
+            <a:r>
+              <a:rPr lang="en-US" sz="2800" b="0" strike="noStrike" spc="-1" dirty="0">
+                <a:latin typeface="Source Sans Pro"/>
+              </a:rPr>
+              <a:t>		push	ra</a:t>
+            </a:r>
+          </a:p>
+          <a:p>
+            <a:pPr marL="540000" lvl="1">
+              <a:spcAft>
+                <a:spcPts val="1123"/>
+              </a:spcAft>
+              <a:buClr>
+                <a:srgbClr val="04617B"/>
+              </a:buClr>
+              <a:buSzPct val="75000"/>
+            </a:pPr>
+            <a:r>
+              <a:rPr lang="en-US" sz="2800" b="0" strike="noStrike" spc="-1" dirty="0">
+                <a:latin typeface="Source Sans Pro"/>
+              </a:rPr>
+              <a:t>		push	s0</a:t>
+            </a:r>
+          </a:p>
+          <a:p>
+            <a:pPr marL="540000" lvl="1">
+              <a:spcAft>
+                <a:spcPts val="1123"/>
+              </a:spcAft>
+              <a:buClr>
+                <a:srgbClr val="04617B"/>
+              </a:buClr>
+              <a:buSzPct val="75000"/>
+            </a:pPr>
+            <a:r>
+              <a:rPr lang="en-US" sz="2800" b="0" strike="noStrike" spc="-1" dirty="0">
+                <a:latin typeface="Source Sans Pro"/>
+              </a:rPr>
+              <a:t>		</a:t>
+            </a:r>
+          </a:p>
+          <a:p>
+            <a:pPr marL="540000" lvl="1">
+              <a:spcAft>
+                <a:spcPts val="1123"/>
+              </a:spcAft>
+              <a:buClr>
+                <a:srgbClr val="04617B"/>
+              </a:buClr>
+              <a:buSzPct val="75000"/>
+            </a:pPr>
+            <a:r>
+              <a:rPr lang="en-US" sz="2800" spc="-1" dirty="0">
+                <a:latin typeface="Source Sans Pro"/>
+              </a:rPr>
+              <a:t>		</a:t>
+            </a:r>
+            <a:r>
+              <a:rPr lang="en-US" sz="2800" b="0" strike="noStrike" spc="-1" dirty="0">
+                <a:latin typeface="Source Sans Pro"/>
+              </a:rPr>
+              <a:t># my code</a:t>
+            </a:r>
+          </a:p>
+          <a:p>
+            <a:pPr marL="864000" lvl="1" indent="-324000">
+              <a:spcAft>
+                <a:spcPts val="1123"/>
+              </a:spcAft>
+              <a:buClr>
+                <a:srgbClr val="04617B"/>
+              </a:buClr>
+              <a:buSzPct val="75000"/>
+              <a:buFont typeface="Symbol" charset="2"/>
+              <a:buChar char=""/>
+            </a:pPr>
+            <a:endParaRPr lang="en-US" sz="2800" b="0" strike="noStrike" spc="-1" dirty="0">
+              <a:latin typeface="Source Sans Pro"/>
+            </a:endParaRPr>
+          </a:p>
+          <a:p>
+            <a:pPr marL="540000" lvl="1">
+              <a:spcAft>
+                <a:spcPts val="1123"/>
+              </a:spcAft>
+              <a:buClr>
+                <a:srgbClr val="04617B"/>
+              </a:buClr>
+              <a:buSzPct val="75000"/>
+            </a:pPr>
+            <a:r>
+              <a:rPr lang="en-US" sz="2800" b="0" strike="noStrike" spc="-1" dirty="0">
+                <a:latin typeface="Source Sans Pro"/>
+              </a:rPr>
+              <a:t>		pop	s0</a:t>
+            </a:r>
+          </a:p>
+          <a:p>
+            <a:pPr marL="540000" lvl="1">
+              <a:spcAft>
+                <a:spcPts val="1123"/>
+              </a:spcAft>
+              <a:buClr>
+                <a:srgbClr val="04617B"/>
+              </a:buClr>
+              <a:buSzPct val="75000"/>
+            </a:pPr>
+            <a:r>
+              <a:rPr lang="en-US" sz="2800" b="0" strike="noStrike" spc="-1" dirty="0">
+                <a:latin typeface="Source Sans Pro"/>
+              </a:rPr>
+              <a:t>		pop	ra</a:t>
+            </a:r>
+          </a:p>
+          <a:p>
+            <a:pPr marL="540000" lvl="1">
+              <a:spcAft>
+                <a:spcPts val="1123"/>
+              </a:spcAft>
+              <a:buClr>
+                <a:srgbClr val="04617B"/>
+              </a:buClr>
+              <a:buSzPct val="75000"/>
+            </a:pPr>
+            <a:r>
+              <a:rPr lang="en-US" sz="2800" b="0" strike="noStrike" spc="-1" dirty="0">
+                <a:latin typeface="Source Sans Pro"/>
+              </a:rPr>
+              <a:t>		</a:t>
+            </a:r>
+            <a:r>
+              <a:rPr lang="en-US" sz="2800" b="0" strike="noStrike" spc="-1" dirty="0" err="1">
+                <a:latin typeface="Source Sans Pro"/>
+              </a:rPr>
+              <a:t>jr</a:t>
+            </a:r>
+            <a:r>
+              <a:rPr lang="en-US" sz="2800" b="0" strike="noStrike" spc="-1" dirty="0">
+                <a:latin typeface="Source Sans Pro"/>
+              </a:rPr>
+              <a:t>		ra</a:t>
+            </a:r>
+          </a:p>
+        </p:txBody>
+      </p:sp>
+      <p:sp>
+        <p:nvSpPr>
+          <p:cNvPr id="10" name="TextShape 7">
+            <a:extLst>
+              <a:ext uri="{FF2B5EF4-FFF2-40B4-BE49-F238E27FC236}">
+                <a16:creationId xmlns:a16="http://schemas.microsoft.com/office/drawing/2014/main" id="{97FAF96D-71A6-4121-9162-C9CE48C3B360}"/>
+              </a:ext>
+            </a:extLst>
+          </p:cNvPr>
+          <p:cNvSpPr txBox="1"/>
+          <p:nvPr/>
+        </p:nvSpPr>
+        <p:spPr>
+          <a:xfrm>
+            <a:off x="4174942" y="1158910"/>
+            <a:ext cx="2468880" cy="456480"/>
+          </a:xfrm>
+          <a:prstGeom prst="rect">
+            <a:avLst/>
+          </a:prstGeom>
+          <a:noFill/>
+          <a:ln>
+            <a:noFill/>
+          </a:ln>
+        </p:spPr>
+        <p:txBody>
+          <a:bodyPr lIns="36000" tIns="36000" rIns="36000" bIns="36000" anchor="ctr"/>
+          <a:lstStyle/>
+          <a:p>
+            <a:r>
+              <a:rPr lang="en-US" sz="2400" b="1" strike="noStrike" spc="-1" dirty="0">
+                <a:latin typeface="Source Sans Pro"/>
+              </a:rPr>
+              <a:t>Activation Frame</a:t>
+            </a:r>
+          </a:p>
+        </p:txBody>
+      </p:sp>
+      <p:sp>
+        <p:nvSpPr>
+          <p:cNvPr id="11" name="Line 8">
+            <a:extLst>
+              <a:ext uri="{FF2B5EF4-FFF2-40B4-BE49-F238E27FC236}">
+                <a16:creationId xmlns:a16="http://schemas.microsoft.com/office/drawing/2014/main" id="{D0A8FF70-1A73-4503-85F2-14741573B3A7}"/>
+              </a:ext>
+            </a:extLst>
+          </p:cNvPr>
+          <p:cNvSpPr/>
+          <p:nvPr/>
+        </p:nvSpPr>
+        <p:spPr>
+          <a:xfrm flipH="1">
+            <a:off x="3049199" y="1408952"/>
+            <a:ext cx="1057316" cy="31431"/>
+          </a:xfrm>
+          <a:prstGeom prst="line">
+            <a:avLst/>
+          </a:prstGeom>
+          <a:ln w="36000">
+            <a:solidFill>
+              <a:srgbClr val="04617B"/>
+            </a:solidFill>
+            <a:round/>
+            <a:tailEnd type="triangle" w="med" len="med"/>
+          </a:ln>
+        </p:spPr>
+        <p:style>
+          <a:lnRef idx="0">
+            <a:scrgbClr r="0" g="0" b="0"/>
+          </a:lnRef>
+          <a:fillRef idx="0">
+            <a:scrgbClr r="0" g="0" b="0"/>
+          </a:fillRef>
+          <a:effectRef idx="0">
+            <a:scrgbClr r="0" g="0" b="0"/>
+          </a:effectRef>
+          <a:fontRef idx="minor"/>
+        </p:style>
+      </p:sp>
+      <p:sp>
+        <p:nvSpPr>
+          <p:cNvPr id="13" name="Line 10">
+            <a:extLst>
+              <a:ext uri="{FF2B5EF4-FFF2-40B4-BE49-F238E27FC236}">
+                <a16:creationId xmlns:a16="http://schemas.microsoft.com/office/drawing/2014/main" id="{835570C2-B1DC-4B5F-A140-A60A44A2A8C3}"/>
+              </a:ext>
+            </a:extLst>
+          </p:cNvPr>
+          <p:cNvSpPr/>
+          <p:nvPr/>
+        </p:nvSpPr>
+        <p:spPr>
+          <a:xfrm>
+            <a:off x="2844764" y="4598829"/>
+            <a:ext cx="1293799" cy="498747"/>
+          </a:xfrm>
+          <a:prstGeom prst="line">
+            <a:avLst/>
+          </a:prstGeom>
+          <a:ln w="36000">
+            <a:solidFill>
+              <a:srgbClr val="04617B"/>
+            </a:solidFill>
+            <a:round/>
+            <a:tailEnd type="triangle" w="med" len="med"/>
+          </a:ln>
+        </p:spPr>
+        <p:style>
+          <a:lnRef idx="0">
+            <a:scrgbClr r="0" g="0" b="0"/>
+          </a:lnRef>
+          <a:fillRef idx="0">
+            <a:scrgbClr r="0" g="0" b="0"/>
+          </a:fillRef>
+          <a:effectRef idx="0">
+            <a:scrgbClr r="0" g="0" b="0"/>
+          </a:effectRef>
+          <a:fontRef idx="minor"/>
+        </p:style>
+      </p:sp>
+      <p:sp>
+        <p:nvSpPr>
+          <p:cNvPr id="14" name="TextShape 11">
+            <a:extLst>
+              <a:ext uri="{FF2B5EF4-FFF2-40B4-BE49-F238E27FC236}">
+                <a16:creationId xmlns:a16="http://schemas.microsoft.com/office/drawing/2014/main" id="{E27C695C-2AC9-4D38-B24F-50F7D7EE92C2}"/>
+              </a:ext>
+            </a:extLst>
+          </p:cNvPr>
+          <p:cNvSpPr txBox="1"/>
+          <p:nvPr/>
+        </p:nvSpPr>
+        <p:spPr>
+          <a:xfrm>
+            <a:off x="4201559" y="4915104"/>
+            <a:ext cx="3017520" cy="456480"/>
+          </a:xfrm>
+          <a:prstGeom prst="rect">
+            <a:avLst/>
+          </a:prstGeom>
+          <a:noFill/>
+          <a:ln>
+            <a:noFill/>
+          </a:ln>
+        </p:spPr>
+        <p:txBody>
+          <a:bodyPr lIns="36000" tIns="36000" rIns="36000" bIns="36000" anchor="ctr"/>
+          <a:lstStyle/>
+          <a:p>
+            <a:r>
+              <a:rPr lang="en-US" sz="2400" b="1" strike="noStrike" spc="-1" dirty="0">
+                <a:latin typeface="Source Sans Pro"/>
+              </a:rPr>
+              <a:t>Function Epilogue</a:t>
+            </a:r>
+          </a:p>
+        </p:txBody>
+      </p:sp>
+      <p:sp>
+        <p:nvSpPr>
+          <p:cNvPr id="15" name="CustomShape 12">
+            <a:extLst>
+              <a:ext uri="{FF2B5EF4-FFF2-40B4-BE49-F238E27FC236}">
+                <a16:creationId xmlns:a16="http://schemas.microsoft.com/office/drawing/2014/main" id="{966EF3BD-76BB-4F1E-A487-5627AD45685E}"/>
+              </a:ext>
+            </a:extLst>
+          </p:cNvPr>
+          <p:cNvSpPr/>
+          <p:nvPr/>
+        </p:nvSpPr>
+        <p:spPr>
+          <a:xfrm>
+            <a:off x="762365" y="3970788"/>
+            <a:ext cx="2011680" cy="1280160"/>
+          </a:xfrm>
+          <a:prstGeom prst="rect">
+            <a:avLst/>
+          </a:prstGeom>
+          <a:noFill/>
+          <a:ln w="57240">
+            <a:solidFill>
+              <a:srgbClr val="808080"/>
+            </a:solidFill>
+            <a:round/>
+          </a:ln>
+        </p:spPr>
+        <p:style>
+          <a:lnRef idx="0">
+            <a:scrgbClr r="0" g="0" b="0"/>
+          </a:lnRef>
+          <a:fillRef idx="0">
+            <a:scrgbClr r="0" g="0" b="0"/>
+          </a:fillRef>
+          <a:effectRef idx="0">
+            <a:scrgbClr r="0" g="0" b="0"/>
+          </a:effectRef>
+          <a:fontRef idx="minor"/>
+        </p:style>
+      </p:sp>
+      <p:sp>
+        <p:nvSpPr>
+          <p:cNvPr id="16" name="CustomShape 13">
+            <a:extLst>
+              <a:ext uri="{FF2B5EF4-FFF2-40B4-BE49-F238E27FC236}">
+                <a16:creationId xmlns:a16="http://schemas.microsoft.com/office/drawing/2014/main" id="{91E869B6-392D-42B1-80F9-C8C731AE31FB}"/>
+              </a:ext>
+            </a:extLst>
+          </p:cNvPr>
+          <p:cNvSpPr/>
+          <p:nvPr/>
+        </p:nvSpPr>
+        <p:spPr>
+          <a:xfrm>
+            <a:off x="833085" y="1208019"/>
+            <a:ext cx="2011680" cy="1097280"/>
+          </a:xfrm>
+          <a:prstGeom prst="rect">
+            <a:avLst/>
+          </a:prstGeom>
+          <a:noFill/>
+          <a:ln w="57240">
+            <a:solidFill>
+              <a:srgbClr val="808080"/>
+            </a:solidFill>
+            <a:round/>
+          </a:ln>
+        </p:spPr>
+        <p:style>
+          <a:lnRef idx="0">
+            <a:scrgbClr r="0" g="0" b="0"/>
+          </a:lnRef>
+          <a:fillRef idx="0">
+            <a:scrgbClr r="0" g="0" b="0"/>
+          </a:fillRef>
+          <a:effectRef idx="0">
+            <a:scrgbClr r="0" g="0" b="0"/>
+          </a:effectRef>
+          <a:fontRef idx="minor"/>
+        </p:style>
+      </p:sp>
+      <p:sp>
+        <p:nvSpPr>
+          <p:cNvPr id="17" name="Line 14">
+            <a:extLst>
+              <a:ext uri="{FF2B5EF4-FFF2-40B4-BE49-F238E27FC236}">
+                <a16:creationId xmlns:a16="http://schemas.microsoft.com/office/drawing/2014/main" id="{BAD16EAA-E94E-400C-89F8-3D90202D840C}"/>
+              </a:ext>
+            </a:extLst>
+          </p:cNvPr>
+          <p:cNvSpPr/>
+          <p:nvPr/>
+        </p:nvSpPr>
+        <p:spPr>
+          <a:xfrm>
+            <a:off x="2907760" y="1806144"/>
+            <a:ext cx="1293799" cy="2542699"/>
+          </a:xfrm>
+          <a:prstGeom prst="line">
+            <a:avLst/>
+          </a:prstGeom>
+          <a:ln w="36000">
+            <a:solidFill>
+              <a:srgbClr val="04617B"/>
+            </a:solidFill>
+            <a:round/>
+            <a:tailEnd type="triangle" w="med" len="med"/>
+          </a:ln>
+        </p:spPr>
+        <p:style>
+          <a:lnRef idx="0">
+            <a:scrgbClr r="0" g="0" b="0"/>
+          </a:lnRef>
+          <a:fillRef idx="0">
+            <a:scrgbClr r="0" g="0" b="0"/>
+          </a:fillRef>
+          <a:effectRef idx="0">
+            <a:scrgbClr r="0" g="0" b="0"/>
+          </a:effectRef>
+          <a:fontRef idx="minor"/>
+        </p:style>
+      </p:sp>
+      <p:sp>
+        <p:nvSpPr>
+          <p:cNvPr id="18" name="TextShape 15">
+            <a:extLst>
+              <a:ext uri="{FF2B5EF4-FFF2-40B4-BE49-F238E27FC236}">
+                <a16:creationId xmlns:a16="http://schemas.microsoft.com/office/drawing/2014/main" id="{F27356B0-32FC-47E3-8D02-9485E2571AD0}"/>
+              </a:ext>
+            </a:extLst>
+          </p:cNvPr>
+          <p:cNvSpPr txBox="1"/>
+          <p:nvPr/>
+        </p:nvSpPr>
+        <p:spPr>
+          <a:xfrm>
+            <a:off x="4201559" y="4274304"/>
+            <a:ext cx="3017520" cy="456480"/>
+          </a:xfrm>
+          <a:prstGeom prst="rect">
+            <a:avLst/>
+          </a:prstGeom>
+          <a:noFill/>
+          <a:ln>
+            <a:noFill/>
+          </a:ln>
+        </p:spPr>
+        <p:txBody>
+          <a:bodyPr lIns="36000" tIns="36000" rIns="36000" bIns="36000" anchor="ctr"/>
+          <a:lstStyle/>
+          <a:p>
+            <a:r>
+              <a:rPr lang="en-US" sz="2400" b="1" strike="noStrike" spc="-1">
+                <a:latin typeface="Source Sans Pro"/>
+              </a:rPr>
+              <a:t>Function Prologue</a:t>
+            </a:r>
+          </a:p>
+        </p:txBody>
+      </p:sp>
+      <p:sp>
+        <p:nvSpPr>
+          <p:cNvPr id="19" name="TextShape 16">
+            <a:extLst>
+              <a:ext uri="{FF2B5EF4-FFF2-40B4-BE49-F238E27FC236}">
+                <a16:creationId xmlns:a16="http://schemas.microsoft.com/office/drawing/2014/main" id="{E03A748A-6AAF-44AF-9F5F-D00006C6E840}"/>
+              </a:ext>
+            </a:extLst>
+          </p:cNvPr>
+          <p:cNvSpPr txBox="1"/>
+          <p:nvPr/>
+        </p:nvSpPr>
+        <p:spPr>
+          <a:xfrm>
+            <a:off x="4335274" y="1615390"/>
+            <a:ext cx="2533703" cy="2471205"/>
+          </a:xfrm>
+          <a:prstGeom prst="rect">
+            <a:avLst/>
+          </a:prstGeom>
+          <a:noFill/>
+          <a:ln>
+            <a:noFill/>
+          </a:ln>
+        </p:spPr>
+        <p:txBody>
+          <a:bodyPr lIns="36000" tIns="36000" rIns="36000" bIns="36000" anchor="ctr"/>
+          <a:lstStyle/>
+          <a:p>
+            <a:r>
+              <a:rPr lang="en-US" sz="2200" b="0" strike="noStrike" spc="-1" dirty="0">
+                <a:latin typeface="Source Sans Pro"/>
+              </a:rPr>
+              <a:t>Contains:</a:t>
+            </a:r>
+          </a:p>
+          <a:p>
+            <a:pPr marL="216000" indent="-216000">
+              <a:buClr>
+                <a:srgbClr val="000000"/>
+              </a:buClr>
+              <a:buSzPct val="45000"/>
+              <a:buFont typeface="Wingdings" charset="2"/>
+              <a:buChar char=""/>
+            </a:pPr>
+            <a:r>
+              <a:rPr lang="en-US" sz="2200" b="0" strike="noStrike" spc="-1" dirty="0">
+                <a:latin typeface="Source Sans Pro"/>
+              </a:rPr>
+              <a:t>Arguments (that aren’t in registers)</a:t>
+            </a:r>
+          </a:p>
+          <a:p>
+            <a:pPr marL="216000" indent="-216000">
+              <a:buClr>
+                <a:srgbClr val="000000"/>
+              </a:buClr>
+              <a:buSzPct val="45000"/>
+              <a:buFont typeface="Wingdings" charset="2"/>
+              <a:buChar char=""/>
+            </a:pPr>
+            <a:r>
+              <a:rPr lang="en-US" sz="2200" b="0" strike="noStrike" spc="-1" dirty="0">
+                <a:latin typeface="Source Sans Pro"/>
+              </a:rPr>
+              <a:t>Saved Registers (ra, s0, </a:t>
+            </a:r>
+            <a:r>
+              <a:rPr lang="en-US" sz="2200" b="0" strike="noStrike" spc="-1" dirty="0" err="1">
+                <a:latin typeface="Source Sans Pro"/>
+              </a:rPr>
+              <a:t>etc</a:t>
+            </a:r>
+            <a:r>
+              <a:rPr lang="en-US" sz="2200" b="0" strike="noStrike" spc="-1" dirty="0">
+                <a:latin typeface="Source Sans Pro"/>
+              </a:rPr>
+              <a:t>)</a:t>
+            </a:r>
+          </a:p>
+          <a:p>
+            <a:pPr marL="216000" indent="-216000">
+              <a:buClr>
+                <a:srgbClr val="000000"/>
+              </a:buClr>
+              <a:buSzPct val="45000"/>
+              <a:buFont typeface="Wingdings" charset="2"/>
+              <a:buChar char=""/>
+            </a:pPr>
+            <a:r>
+              <a:rPr lang="en-US" sz="2200" b="0" strike="noStrike" spc="-1" dirty="0">
+                <a:latin typeface="Source Sans Pro"/>
+              </a:rPr>
+              <a:t>Local Variables</a:t>
+            </a:r>
+          </a:p>
+        </p:txBody>
+      </p:sp>
+      <p:sp>
+        <p:nvSpPr>
+          <p:cNvPr id="20" name="Rectangle 19">
+            <a:extLst>
+              <a:ext uri="{FF2B5EF4-FFF2-40B4-BE49-F238E27FC236}">
+                <a16:creationId xmlns:a16="http://schemas.microsoft.com/office/drawing/2014/main" id="{1063A84A-0441-488E-96CB-D3E0AFEC54B0}"/>
+              </a:ext>
+            </a:extLst>
+          </p:cNvPr>
+          <p:cNvSpPr/>
+          <p:nvPr/>
+        </p:nvSpPr>
+        <p:spPr>
+          <a:xfrm>
+            <a:off x="7390263" y="1332970"/>
+            <a:ext cx="1525137" cy="4038600"/>
+          </a:xfrm>
+          <a:prstGeom prst="rect">
+            <a:avLst/>
+          </a:prstGeom>
+          <a:solidFill>
+            <a:srgbClr val="E9D4E9"/>
+          </a:solidFill>
+          <a:ln>
+            <a:solidFill>
+              <a:schemeClr val="accent1"/>
+            </a:solidFill>
+          </a:ln>
+        </p:spPr>
+        <p:style>
+          <a:lnRef idx="2">
+            <a:schemeClr val="accent1">
+              <a:shade val="50000"/>
+            </a:schemeClr>
+          </a:lnRef>
+          <a:fillRef idx="1">
+            <a:schemeClr val="accent1"/>
+          </a:fillRef>
+          <a:effectRef idx="0">
+            <a:schemeClr val="accent1"/>
+          </a:effectRef>
+          <a:fontRef idx="minor">
+            <a:schemeClr val="lt1"/>
+          </a:fontRef>
+        </p:style>
+        <p:txBody>
+          <a:bodyPr rtlCol="0" anchor="ctr"/>
+          <a:lstStyle/>
+          <a:p>
+            <a:pPr algn="ctr"/>
+            <a:r>
+              <a:rPr lang="en-US" sz="2400" b="1" dirty="0">
+                <a:solidFill>
+                  <a:schemeClr val="bg2">
+                    <a:lumMod val="25000"/>
+                  </a:schemeClr>
+                </a:solidFill>
+              </a:rPr>
+              <a:t>Memory</a:t>
+            </a:r>
+          </a:p>
+        </p:txBody>
+      </p:sp>
+      <p:sp>
+        <p:nvSpPr>
+          <p:cNvPr id="21" name="Rectangle 20">
+            <a:extLst>
+              <a:ext uri="{FF2B5EF4-FFF2-40B4-BE49-F238E27FC236}">
+                <a16:creationId xmlns:a16="http://schemas.microsoft.com/office/drawing/2014/main" id="{501DAB00-3BA2-486B-927E-732500C7A546}"/>
+              </a:ext>
+            </a:extLst>
+          </p:cNvPr>
+          <p:cNvSpPr/>
+          <p:nvPr/>
+        </p:nvSpPr>
+        <p:spPr>
+          <a:xfrm>
+            <a:off x="7458688" y="1416768"/>
+            <a:ext cx="1388286" cy="512149"/>
+          </a:xfrm>
+          <a:prstGeom prst="rect">
+            <a:avLst/>
+          </a:prstGeom>
+        </p:spPr>
+        <p:style>
+          <a:lnRef idx="2">
+            <a:schemeClr val="accent1">
+              <a:shade val="50000"/>
+            </a:schemeClr>
+          </a:lnRef>
+          <a:fillRef idx="1">
+            <a:schemeClr val="accent1"/>
+          </a:fillRef>
+          <a:effectRef idx="0">
+            <a:schemeClr val="accent1"/>
+          </a:effectRef>
+          <a:fontRef idx="minor">
+            <a:schemeClr val="lt1"/>
+          </a:fontRef>
+        </p:style>
+        <p:txBody>
+          <a:bodyPr rtlCol="0" anchor="ctr"/>
+          <a:lstStyle/>
+          <a:p>
+            <a:pPr algn="ctr"/>
+            <a:r>
+              <a:rPr lang="en-US" sz="2000" b="1" dirty="0"/>
+              <a:t>Stack</a:t>
+            </a:r>
+          </a:p>
+        </p:txBody>
+      </p:sp>
+      <p:sp>
+        <p:nvSpPr>
+          <p:cNvPr id="22" name="Slide Number Placeholder 3">
+            <a:extLst>
+              <a:ext uri="{FF2B5EF4-FFF2-40B4-BE49-F238E27FC236}">
+                <a16:creationId xmlns:a16="http://schemas.microsoft.com/office/drawing/2014/main" id="{ECAEE0D7-FF2B-4BF1-8A39-356FCB29AE1B}"/>
+              </a:ext>
+            </a:extLst>
+          </p:cNvPr>
+          <p:cNvSpPr txBox="1">
+            <a:spLocks/>
+          </p:cNvSpPr>
+          <p:nvPr/>
+        </p:nvSpPr>
+        <p:spPr>
+          <a:xfrm>
+            <a:off x="6457950" y="5296959"/>
+            <a:ext cx="2057400" cy="304271"/>
+          </a:xfrm>
+          <a:prstGeom prst="rect">
+            <a:avLst/>
+          </a:prstGeom>
+        </p:spPr>
+        <p:txBody>
+          <a:bodyPr vert="horz" lIns="91440" tIns="45720" rIns="91440" bIns="45720" rtlCol="0" anchor="ctr"/>
+          <a:lstStyle>
+            <a:defPPr>
+              <a:defRPr lang="en-US"/>
+            </a:defPPr>
+            <a:lvl1pPr marL="0" algn="r" defTabSz="356616" rtl="0" eaLnBrk="1" latinLnBrk="0" hangingPunct="1">
+              <a:defRPr sz="900" kern="1200">
+                <a:solidFill>
+                  <a:schemeClr val="tx1">
+                    <a:tint val="75000"/>
+                  </a:schemeClr>
+                </a:solidFill>
+                <a:latin typeface="+mn-lt"/>
+                <a:ea typeface="+mn-ea"/>
+                <a:cs typeface="+mn-cs"/>
+              </a:defRPr>
+            </a:lvl1pPr>
+            <a:lvl2pPr marL="356616" algn="l" defTabSz="356616" rtl="0" eaLnBrk="1" latinLnBrk="0" hangingPunct="1">
+              <a:defRPr sz="1404" kern="1200">
+                <a:solidFill>
+                  <a:schemeClr val="tx1"/>
+                </a:solidFill>
+                <a:latin typeface="+mn-lt"/>
+                <a:ea typeface="+mn-ea"/>
+                <a:cs typeface="+mn-cs"/>
+              </a:defRPr>
+            </a:lvl2pPr>
+            <a:lvl3pPr marL="713232" algn="l" defTabSz="356616" rtl="0" eaLnBrk="1" latinLnBrk="0" hangingPunct="1">
+              <a:defRPr sz="1404" kern="1200">
+                <a:solidFill>
+                  <a:schemeClr val="tx1"/>
+                </a:solidFill>
+                <a:latin typeface="+mn-lt"/>
+                <a:ea typeface="+mn-ea"/>
+                <a:cs typeface="+mn-cs"/>
+              </a:defRPr>
+            </a:lvl3pPr>
+            <a:lvl4pPr marL="1069848" algn="l" defTabSz="356616" rtl="0" eaLnBrk="1" latinLnBrk="0" hangingPunct="1">
+              <a:defRPr sz="1404" kern="1200">
+                <a:solidFill>
+                  <a:schemeClr val="tx1"/>
+                </a:solidFill>
+                <a:latin typeface="+mn-lt"/>
+                <a:ea typeface="+mn-ea"/>
+                <a:cs typeface="+mn-cs"/>
+              </a:defRPr>
+            </a:lvl4pPr>
+            <a:lvl5pPr marL="1426464" algn="l" defTabSz="356616" rtl="0" eaLnBrk="1" latinLnBrk="0" hangingPunct="1">
+              <a:defRPr sz="1404" kern="1200">
+                <a:solidFill>
+                  <a:schemeClr val="tx1"/>
+                </a:solidFill>
+                <a:latin typeface="+mn-lt"/>
+                <a:ea typeface="+mn-ea"/>
+                <a:cs typeface="+mn-cs"/>
+              </a:defRPr>
+            </a:lvl5pPr>
+            <a:lvl6pPr marL="1783080" algn="l" defTabSz="356616" rtl="0" eaLnBrk="1" latinLnBrk="0" hangingPunct="1">
+              <a:defRPr sz="1404" kern="1200">
+                <a:solidFill>
+                  <a:schemeClr val="tx1"/>
+                </a:solidFill>
+                <a:latin typeface="+mn-lt"/>
+                <a:ea typeface="+mn-ea"/>
+                <a:cs typeface="+mn-cs"/>
+              </a:defRPr>
+            </a:lvl6pPr>
+            <a:lvl7pPr marL="2139696" algn="l" defTabSz="356616" rtl="0" eaLnBrk="1" latinLnBrk="0" hangingPunct="1">
+              <a:defRPr sz="1404" kern="1200">
+                <a:solidFill>
+                  <a:schemeClr val="tx1"/>
+                </a:solidFill>
+                <a:latin typeface="+mn-lt"/>
+                <a:ea typeface="+mn-ea"/>
+                <a:cs typeface="+mn-cs"/>
+              </a:defRPr>
+            </a:lvl7pPr>
+            <a:lvl8pPr marL="2496312" algn="l" defTabSz="356616" rtl="0" eaLnBrk="1" latinLnBrk="0" hangingPunct="1">
+              <a:defRPr sz="1404" kern="1200">
+                <a:solidFill>
+                  <a:schemeClr val="tx1"/>
+                </a:solidFill>
+                <a:latin typeface="+mn-lt"/>
+                <a:ea typeface="+mn-ea"/>
+                <a:cs typeface="+mn-cs"/>
+              </a:defRPr>
+            </a:lvl8pPr>
+            <a:lvl9pPr marL="2852928" algn="l" defTabSz="356616" rtl="0" eaLnBrk="1" latinLnBrk="0" hangingPunct="1">
+              <a:defRPr sz="1404" kern="1200">
+                <a:solidFill>
+                  <a:schemeClr val="tx1"/>
+                </a:solidFill>
+                <a:latin typeface="+mn-lt"/>
+                <a:ea typeface="+mn-ea"/>
+                <a:cs typeface="+mn-cs"/>
+              </a:defRPr>
+            </a:lvl9pPr>
+          </a:lstStyle>
+          <a:p>
+            <a:fld id="{8228C0A2-10A0-40F7-BAE1-3BE620EEA294}" type="slidenum">
+              <a:rPr lang="en-US" smtClean="0"/>
+              <a:pPr/>
+              <a:t>13</a:t>
+            </a:fld>
+            <a:endParaRPr lang="en-US" dirty="0"/>
+          </a:p>
+        </p:txBody>
+      </p:sp>
+      <p:sp>
+        <p:nvSpPr>
+          <p:cNvPr id="23" name="Rectangle 22">
+            <a:extLst>
+              <a:ext uri="{FF2B5EF4-FFF2-40B4-BE49-F238E27FC236}">
+                <a16:creationId xmlns:a16="http://schemas.microsoft.com/office/drawing/2014/main" id="{7D3F97FE-0757-4C69-830D-8BF5D0855141}"/>
+              </a:ext>
+            </a:extLst>
+          </p:cNvPr>
+          <p:cNvSpPr/>
+          <p:nvPr/>
+        </p:nvSpPr>
+        <p:spPr>
+          <a:xfrm>
+            <a:off x="7462039" y="4533370"/>
+            <a:ext cx="1388286" cy="763589"/>
+          </a:xfrm>
+          <a:prstGeom prst="rect">
+            <a:avLst/>
+          </a:prstGeom>
+          <a:solidFill>
+            <a:srgbClr val="92D050"/>
+          </a:solidFill>
+          <a:ln>
+            <a:solidFill>
+              <a:schemeClr val="accent1"/>
+            </a:solidFill>
+          </a:ln>
+        </p:spPr>
+        <p:style>
+          <a:lnRef idx="2">
+            <a:schemeClr val="accent1">
+              <a:shade val="50000"/>
+            </a:schemeClr>
+          </a:lnRef>
+          <a:fillRef idx="1">
+            <a:schemeClr val="accent1"/>
+          </a:fillRef>
+          <a:effectRef idx="0">
+            <a:schemeClr val="accent1"/>
+          </a:effectRef>
+          <a:fontRef idx="minor">
+            <a:schemeClr val="lt1"/>
+          </a:fontRef>
+        </p:style>
+        <p:txBody>
+          <a:bodyPr rtlCol="0" anchor="ctr"/>
+          <a:lstStyle/>
+          <a:p>
+            <a:pPr algn="ctr"/>
+            <a:r>
+              <a:rPr lang="en-US" sz="2000" b="1" dirty="0">
+                <a:solidFill>
+                  <a:schemeClr val="tx1">
+                    <a:lumMod val="95000"/>
+                    <a:lumOff val="5000"/>
+                  </a:schemeClr>
+                </a:solidFill>
+              </a:rPr>
+              <a:t>Program</a:t>
+            </a:r>
+          </a:p>
+        </p:txBody>
+      </p:sp>
+      <p:sp>
+        <p:nvSpPr>
+          <p:cNvPr id="24" name="Rectangle 23">
+            <a:extLst>
+              <a:ext uri="{FF2B5EF4-FFF2-40B4-BE49-F238E27FC236}">
+                <a16:creationId xmlns:a16="http://schemas.microsoft.com/office/drawing/2014/main" id="{D282F090-8ECE-4850-A533-2F4B00E984A4}"/>
+              </a:ext>
+            </a:extLst>
+          </p:cNvPr>
+          <p:cNvSpPr/>
+          <p:nvPr/>
+        </p:nvSpPr>
+        <p:spPr>
+          <a:xfrm>
+            <a:off x="7458688" y="4229099"/>
+            <a:ext cx="1388286" cy="304271"/>
+          </a:xfrm>
+          <a:prstGeom prst="rect">
+            <a:avLst/>
+          </a:prstGeom>
+          <a:solidFill>
+            <a:srgbClr val="98389D"/>
+          </a:solidFill>
+          <a:ln>
+            <a:solidFill>
+              <a:schemeClr val="accent1"/>
+            </a:solidFill>
+          </a:ln>
+        </p:spPr>
+        <p:style>
+          <a:lnRef idx="2">
+            <a:schemeClr val="accent1">
+              <a:shade val="50000"/>
+            </a:schemeClr>
+          </a:lnRef>
+          <a:fillRef idx="1">
+            <a:schemeClr val="accent1"/>
+          </a:fillRef>
+          <a:effectRef idx="0">
+            <a:schemeClr val="accent1"/>
+          </a:effectRef>
+          <a:fontRef idx="minor">
+            <a:schemeClr val="lt1"/>
+          </a:fontRef>
+        </p:style>
+        <p:txBody>
+          <a:bodyPr rtlCol="0" anchor="ctr"/>
+          <a:lstStyle/>
+          <a:p>
+            <a:pPr algn="ctr"/>
+            <a:r>
+              <a:rPr lang="en-US" sz="2000" b="1" dirty="0">
+                <a:solidFill>
+                  <a:schemeClr val="bg1"/>
+                </a:solidFill>
+              </a:rPr>
+              <a:t>Heap</a:t>
+            </a:r>
+          </a:p>
+        </p:txBody>
+      </p:sp>
+      <p:sp>
+        <p:nvSpPr>
+          <p:cNvPr id="25" name="TextBox 24">
+            <a:extLst>
+              <a:ext uri="{FF2B5EF4-FFF2-40B4-BE49-F238E27FC236}">
+                <a16:creationId xmlns:a16="http://schemas.microsoft.com/office/drawing/2014/main" id="{93FC88F7-529C-4954-98C4-BC815C3D3D0E}"/>
+              </a:ext>
+            </a:extLst>
+          </p:cNvPr>
+          <p:cNvSpPr txBox="1"/>
+          <p:nvPr/>
+        </p:nvSpPr>
+        <p:spPr>
+          <a:xfrm>
+            <a:off x="7671646" y="5342910"/>
+            <a:ext cx="974947" cy="369332"/>
+          </a:xfrm>
+          <a:prstGeom prst="rect">
+            <a:avLst/>
+          </a:prstGeom>
+          <a:noFill/>
+        </p:spPr>
+        <p:txBody>
+          <a:bodyPr wrap="none" rtlCol="0">
+            <a:spAutoFit/>
+          </a:bodyPr>
+          <a:lstStyle/>
+          <a:p>
+            <a:r>
+              <a:rPr lang="en-US" sz="1800" b="1" dirty="0"/>
+              <a:t>0x0000</a:t>
+            </a:r>
+          </a:p>
+        </p:txBody>
+      </p:sp>
+      <p:sp>
+        <p:nvSpPr>
+          <p:cNvPr id="27" name="Rectangle 26">
+            <a:extLst>
+              <a:ext uri="{FF2B5EF4-FFF2-40B4-BE49-F238E27FC236}">
+                <a16:creationId xmlns:a16="http://schemas.microsoft.com/office/drawing/2014/main" id="{A963A86A-A3F9-4ADC-8522-A31FD61CA393}"/>
+              </a:ext>
+            </a:extLst>
+          </p:cNvPr>
+          <p:cNvSpPr/>
+          <p:nvPr/>
+        </p:nvSpPr>
+        <p:spPr>
+          <a:xfrm>
+            <a:off x="7458688" y="1408953"/>
+            <a:ext cx="1388286" cy="90938"/>
+          </a:xfrm>
+          <a:prstGeom prst="rect">
+            <a:avLst/>
+          </a:prstGeom>
+          <a:solidFill>
+            <a:srgbClr val="FFC000"/>
+          </a:solidFill>
+          <a:ln>
+            <a:solidFill>
+              <a:schemeClr val="accent1"/>
+            </a:solidFill>
+          </a:ln>
+        </p:spPr>
+        <p:style>
+          <a:lnRef idx="2">
+            <a:schemeClr val="accent1">
+              <a:shade val="50000"/>
+            </a:schemeClr>
+          </a:lnRef>
+          <a:fillRef idx="1">
+            <a:schemeClr val="accent1"/>
+          </a:fillRef>
+          <a:effectRef idx="0">
+            <a:schemeClr val="accent1"/>
+          </a:effectRef>
+          <a:fontRef idx="minor">
+            <a:schemeClr val="lt1"/>
+          </a:fontRef>
+        </p:style>
+        <p:txBody>
+          <a:bodyPr rtlCol="0" anchor="ctr"/>
+          <a:lstStyle/>
+          <a:p>
+            <a:pPr algn="ctr"/>
+            <a:endParaRPr lang="en-US" sz="2000" b="1" dirty="0">
+              <a:solidFill>
+                <a:srgbClr val="FF0000"/>
+              </a:solidFill>
+            </a:endParaRPr>
+          </a:p>
+        </p:txBody>
+      </p:sp>
+      <p:sp>
+        <p:nvSpPr>
+          <p:cNvPr id="28" name="Rectangle 27">
+            <a:extLst>
+              <a:ext uri="{FF2B5EF4-FFF2-40B4-BE49-F238E27FC236}">
+                <a16:creationId xmlns:a16="http://schemas.microsoft.com/office/drawing/2014/main" id="{94640729-DC9C-4F8B-A9E8-B58B3B316FC5}"/>
+              </a:ext>
+            </a:extLst>
+          </p:cNvPr>
+          <p:cNvSpPr/>
+          <p:nvPr/>
+        </p:nvSpPr>
+        <p:spPr>
+          <a:xfrm>
+            <a:off x="7458688" y="3855821"/>
+            <a:ext cx="1388286" cy="369332"/>
+          </a:xfrm>
+          <a:prstGeom prst="rect">
+            <a:avLst/>
+          </a:prstGeom>
+          <a:solidFill>
+            <a:srgbClr val="98389D"/>
+          </a:solidFill>
+          <a:ln>
+            <a:solidFill>
+              <a:schemeClr val="accent1"/>
+            </a:solidFill>
+          </a:ln>
+        </p:spPr>
+        <p:style>
+          <a:lnRef idx="2">
+            <a:schemeClr val="accent1">
+              <a:shade val="50000"/>
+            </a:schemeClr>
+          </a:lnRef>
+          <a:fillRef idx="1">
+            <a:schemeClr val="accent1"/>
+          </a:fillRef>
+          <a:effectRef idx="0">
+            <a:schemeClr val="accent1"/>
+          </a:effectRef>
+          <a:fontRef idx="minor">
+            <a:schemeClr val="lt1"/>
+          </a:fontRef>
+        </p:style>
+        <p:txBody>
+          <a:bodyPr rtlCol="0" anchor="ctr"/>
+          <a:lstStyle/>
+          <a:p>
+            <a:pPr algn="ctr"/>
+            <a:endParaRPr lang="en-US" sz="2000" b="1" dirty="0">
+              <a:solidFill>
+                <a:schemeClr val="bg1"/>
+              </a:solidFill>
+            </a:endParaRPr>
+          </a:p>
+        </p:txBody>
+      </p:sp>
+      <p:sp>
+        <p:nvSpPr>
+          <p:cNvPr id="29" name="Rectangle 28">
+            <a:extLst>
+              <a:ext uri="{FF2B5EF4-FFF2-40B4-BE49-F238E27FC236}">
+                <a16:creationId xmlns:a16="http://schemas.microsoft.com/office/drawing/2014/main" id="{DE53A9B9-5F04-47D5-9517-8171DBFF3138}"/>
+              </a:ext>
+            </a:extLst>
+          </p:cNvPr>
+          <p:cNvSpPr/>
+          <p:nvPr/>
+        </p:nvSpPr>
+        <p:spPr>
+          <a:xfrm>
+            <a:off x="7458688" y="1499891"/>
+            <a:ext cx="1388286" cy="90938"/>
+          </a:xfrm>
+          <a:prstGeom prst="rect">
+            <a:avLst/>
+          </a:prstGeom>
+          <a:solidFill>
+            <a:srgbClr val="FFC000"/>
+          </a:solidFill>
+          <a:ln>
+            <a:solidFill>
+              <a:schemeClr val="accent1"/>
+            </a:solidFill>
+          </a:ln>
+        </p:spPr>
+        <p:style>
+          <a:lnRef idx="2">
+            <a:schemeClr val="accent1">
+              <a:shade val="50000"/>
+            </a:schemeClr>
+          </a:lnRef>
+          <a:fillRef idx="1">
+            <a:schemeClr val="accent1"/>
+          </a:fillRef>
+          <a:effectRef idx="0">
+            <a:schemeClr val="accent1"/>
+          </a:effectRef>
+          <a:fontRef idx="minor">
+            <a:schemeClr val="lt1"/>
+          </a:fontRef>
+        </p:style>
+        <p:txBody>
+          <a:bodyPr rtlCol="0" anchor="ctr"/>
+          <a:lstStyle/>
+          <a:p>
+            <a:pPr algn="ctr"/>
+            <a:endParaRPr lang="en-US" sz="2000" b="1" dirty="0">
+              <a:solidFill>
+                <a:srgbClr val="FF0000"/>
+              </a:solidFill>
+            </a:endParaRPr>
+          </a:p>
+        </p:txBody>
+      </p:sp>
+      <p:sp>
+        <p:nvSpPr>
+          <p:cNvPr id="30" name="Rectangle 29">
+            <a:extLst>
+              <a:ext uri="{FF2B5EF4-FFF2-40B4-BE49-F238E27FC236}">
+                <a16:creationId xmlns:a16="http://schemas.microsoft.com/office/drawing/2014/main" id="{D2F9FB21-0DB2-423D-AB41-4D5EEB8855DE}"/>
+              </a:ext>
+            </a:extLst>
+          </p:cNvPr>
+          <p:cNvSpPr/>
+          <p:nvPr/>
+        </p:nvSpPr>
+        <p:spPr>
+          <a:xfrm>
+            <a:off x="7458688" y="2981297"/>
+            <a:ext cx="1388286" cy="870578"/>
+          </a:xfrm>
+          <a:prstGeom prst="rect">
+            <a:avLst/>
+          </a:prstGeom>
+          <a:solidFill>
+            <a:srgbClr val="98389D"/>
+          </a:solidFill>
+          <a:ln>
+            <a:solidFill>
+              <a:schemeClr val="accent1"/>
+            </a:solidFill>
+          </a:ln>
+        </p:spPr>
+        <p:style>
+          <a:lnRef idx="2">
+            <a:schemeClr val="accent1">
+              <a:shade val="50000"/>
+            </a:schemeClr>
+          </a:lnRef>
+          <a:fillRef idx="1">
+            <a:schemeClr val="accent1"/>
+          </a:fillRef>
+          <a:effectRef idx="0">
+            <a:schemeClr val="accent1"/>
+          </a:effectRef>
+          <a:fontRef idx="minor">
+            <a:schemeClr val="lt1"/>
+          </a:fontRef>
+        </p:style>
+        <p:txBody>
+          <a:bodyPr rtlCol="0" anchor="ctr"/>
+          <a:lstStyle/>
+          <a:p>
+            <a:pPr algn="ctr"/>
+            <a:endParaRPr lang="en-US" sz="2000" b="1" dirty="0">
+              <a:solidFill>
+                <a:schemeClr val="bg1"/>
+              </a:solidFill>
+            </a:endParaRPr>
+          </a:p>
+        </p:txBody>
+      </p:sp>
+      <p:sp>
+        <p:nvSpPr>
+          <p:cNvPr id="31" name="TextBox 30">
+            <a:extLst>
+              <a:ext uri="{FF2B5EF4-FFF2-40B4-BE49-F238E27FC236}">
+                <a16:creationId xmlns:a16="http://schemas.microsoft.com/office/drawing/2014/main" id="{08D18782-62E2-4549-9769-9B67255B968E}"/>
+              </a:ext>
+            </a:extLst>
+          </p:cNvPr>
+          <p:cNvSpPr txBox="1"/>
+          <p:nvPr/>
+        </p:nvSpPr>
+        <p:spPr>
+          <a:xfrm>
+            <a:off x="7743084" y="956956"/>
+            <a:ext cx="808235" cy="369332"/>
+          </a:xfrm>
+          <a:prstGeom prst="rect">
+            <a:avLst/>
+          </a:prstGeom>
+          <a:noFill/>
+        </p:spPr>
+        <p:txBody>
+          <a:bodyPr wrap="none" rtlCol="0">
+            <a:spAutoFit/>
+          </a:bodyPr>
+          <a:lstStyle/>
+          <a:p>
+            <a:r>
+              <a:rPr lang="en-US" sz="1800" b="1" dirty="0"/>
+              <a:t>0xffff</a:t>
+            </a:r>
+          </a:p>
+        </p:txBody>
+      </p:sp>
+      <p:sp>
+        <p:nvSpPr>
+          <p:cNvPr id="9" name="Line 6">
+            <a:extLst>
+              <a:ext uri="{FF2B5EF4-FFF2-40B4-BE49-F238E27FC236}">
+                <a16:creationId xmlns:a16="http://schemas.microsoft.com/office/drawing/2014/main" id="{B57D5CE4-A9DE-47BE-9F52-425ADA0D7D6C}"/>
+              </a:ext>
+            </a:extLst>
+          </p:cNvPr>
+          <p:cNvSpPr/>
+          <p:nvPr/>
+        </p:nvSpPr>
+        <p:spPr>
+          <a:xfrm flipV="1">
+            <a:off x="4201560" y="1565515"/>
+            <a:ext cx="3257128" cy="8775"/>
+          </a:xfrm>
+          <a:prstGeom prst="line">
+            <a:avLst/>
+          </a:prstGeom>
+          <a:ln w="36000">
+            <a:solidFill>
+              <a:srgbClr val="04617B"/>
+            </a:solidFill>
+            <a:round/>
+            <a:tailEnd type="triangle" w="med" len="med"/>
+          </a:ln>
+        </p:spPr>
+        <p:style>
+          <a:lnRef idx="0">
+            <a:scrgbClr r="0" g="0" b="0"/>
+          </a:lnRef>
+          <a:fillRef idx="0">
+            <a:scrgbClr r="0" g="0" b="0"/>
+          </a:fillRef>
+          <a:effectRef idx="0">
+            <a:scrgbClr r="0" g="0" b="0"/>
+          </a:effectRef>
+          <a:fontRef idx="minor"/>
+        </p:style>
+      </p:sp>
+    </p:spTree>
+    <p:extLst>
+      <p:ext uri="{BB962C8B-B14F-4D97-AF65-F5344CB8AC3E}">
+        <p14:creationId xmlns:p14="http://schemas.microsoft.com/office/powerpoint/2010/main" val="4244302870"/>
+      </p:ext>
+    </p:extLst>
+  </p:cSld>
+  <p:clrMapOvr>
+    <a:masterClrMapping/>
+  </p:clrMapOvr>
 </p:sld>
 </file>
 

</xml_diff>